<commit_message>
Completed Stats Module 2
</commit_message>
<xml_diff>
--- a/2. Stats Essentials/2.Investment Assignment/INVEST.pptx
+++ b/2. Stats Essentials/2.Investment Assignment/INVEST.pptx
@@ -5,7 +5,7 @@
     <p:sldMasterId id="2147483660" r:id="rId1"/>
   </p:sldMasterIdLst>
   <p:notesMasterIdLst>
-    <p:notesMasterId r:id="rId12"/>
+    <p:notesMasterId r:id="rId10"/>
   </p:notesMasterIdLst>
   <p:sldIdLst>
     <p:sldId id="256" r:id="rId2"/>
@@ -14,10 +14,8 @@
     <p:sldId id="259" r:id="rId5"/>
     <p:sldId id="260" r:id="rId6"/>
     <p:sldId id="267" r:id="rId7"/>
-    <p:sldId id="262" r:id="rId8"/>
-    <p:sldId id="268" r:id="rId9"/>
-    <p:sldId id="269" r:id="rId10"/>
-    <p:sldId id="265" r:id="rId11"/>
+    <p:sldId id="269" r:id="rId8"/>
+    <p:sldId id="265" r:id="rId9"/>
   </p:sldIdLst>
   <p:sldSz cx="12192000" cy="6858000"/>
   <p:notesSz cx="6858000" cy="9144000"/>
@@ -209,7 +207,7 @@
           <a:p>
             <a:fld id="{2E309023-AF2B-4043-B228-F191CADC9BB1}" type="datetimeFigureOut">
               <a:rPr lang="en-IN" smtClean="0"/>
-              <a:t>21-05-2019</a:t>
+              <a:t>12/03/21</a:t>
             </a:fld>
             <a:endParaRPr lang="en-IN"/>
           </a:p>
@@ -606,9 +604,9 @@
           <a:bodyPr/>
           <a:lstStyle/>
           <a:p>
-            <a:fld id="{70C018FE-C8D6-4A9C-A702-41F1E0C1C452}" type="datetimeFigureOut">
+            <a:fld id="{58036A15-E0BA-4B4F-8784-D745B928A6FB}" type="datetime1">
               <a:rPr lang="en-IN" smtClean="0"/>
-              <a:t>21-05-2019</a:t>
+              <a:t>12/03/21</a:t>
             </a:fld>
             <a:endParaRPr lang="en-IN"/>
           </a:p>
@@ -776,9 +774,9 @@
           <a:bodyPr/>
           <a:lstStyle/>
           <a:p>
-            <a:fld id="{70C018FE-C8D6-4A9C-A702-41F1E0C1C452}" type="datetimeFigureOut">
+            <a:fld id="{40AFA44B-32C9-F643-A064-65C5C8BC0178}" type="datetime1">
               <a:rPr lang="en-IN" smtClean="0"/>
-              <a:t>21-05-2019</a:t>
+              <a:t>12/03/21</a:t>
             </a:fld>
             <a:endParaRPr lang="en-IN"/>
           </a:p>
@@ -956,9 +954,9 @@
           <a:bodyPr/>
           <a:lstStyle/>
           <a:p>
-            <a:fld id="{70C018FE-C8D6-4A9C-A702-41F1E0C1C452}" type="datetimeFigureOut">
+            <a:fld id="{4AC5852E-5996-A041-A568-97DBA53F28A0}" type="datetime1">
               <a:rPr lang="en-IN" smtClean="0"/>
-              <a:t>21-05-2019</a:t>
+              <a:t>12/03/21</a:t>
             </a:fld>
             <a:endParaRPr lang="en-IN"/>
           </a:p>
@@ -1138,10 +1136,10 @@
           <a:bodyPr/>
           <a:lstStyle/>
           <a:p>
-            <a:r>
-              <a:rPr lang="en-IN"/>
-              <a:t>09-06-2016</a:t>
-            </a:r>
+            <a:fld id="{0D03E6E5-1042-5E4B-834E-6A449ED7BE87}" type="datetime1">
+              <a:rPr lang="en-IN" smtClean="0"/>
+              <a:t>12/03/21</a:t>
+            </a:fld>
             <a:endParaRPr lang="en-IN" dirty="0"/>
           </a:p>
         </p:txBody>
@@ -1161,10 +1159,6 @@
           <a:bodyPr/>
           <a:lstStyle/>
           <a:p>
-            <a:r>
-              <a:rPr lang="en-IN"/>
-              <a:t>Investment Case Study</a:t>
-            </a:r>
             <a:endParaRPr lang="en-IN" dirty="0"/>
           </a:p>
         </p:txBody>
@@ -1388,9 +1382,9 @@
           <a:bodyPr/>
           <a:lstStyle/>
           <a:p>
-            <a:fld id="{70C018FE-C8D6-4A9C-A702-41F1E0C1C452}" type="datetimeFigureOut">
+            <a:fld id="{25545A5E-DB65-714A-BED1-3291967B57EF}" type="datetime1">
               <a:rPr lang="en-IN" smtClean="0"/>
-              <a:t>21-05-2019</a:t>
+              <a:t>12/03/21</a:t>
             </a:fld>
             <a:endParaRPr lang="en-IN"/>
           </a:p>
@@ -1620,9 +1614,9 @@
           <a:bodyPr/>
           <a:lstStyle/>
           <a:p>
-            <a:fld id="{70C018FE-C8D6-4A9C-A702-41F1E0C1C452}" type="datetimeFigureOut">
+            <a:fld id="{0AB51B26-E3DA-EC41-BA30-390C9B65AD94}" type="datetime1">
               <a:rPr lang="en-IN" smtClean="0"/>
-              <a:t>21-05-2019</a:t>
+              <a:t>12/03/21</a:t>
             </a:fld>
             <a:endParaRPr lang="en-IN"/>
           </a:p>
@@ -1987,9 +1981,9 @@
           <a:bodyPr/>
           <a:lstStyle/>
           <a:p>
-            <a:fld id="{70C018FE-C8D6-4A9C-A702-41F1E0C1C452}" type="datetimeFigureOut">
+            <a:fld id="{3FB60883-9878-324D-8FB0-E3C26B4CD39A}" type="datetime1">
               <a:rPr lang="en-IN" smtClean="0"/>
-              <a:t>21-05-2019</a:t>
+              <a:t>12/03/21</a:t>
             </a:fld>
             <a:endParaRPr lang="en-IN"/>
           </a:p>
@@ -2105,9 +2099,9 @@
           <a:bodyPr/>
           <a:lstStyle/>
           <a:p>
-            <a:fld id="{70C018FE-C8D6-4A9C-A702-41F1E0C1C452}" type="datetimeFigureOut">
+            <a:fld id="{B9864378-CB39-8D43-BD42-1378A61F91D2}" type="datetime1">
               <a:rPr lang="en-IN" smtClean="0"/>
-              <a:t>21-05-2019</a:t>
+              <a:t>12/03/21</a:t>
             </a:fld>
             <a:endParaRPr lang="en-IN"/>
           </a:p>
@@ -2200,9 +2194,9 @@
           <a:bodyPr/>
           <a:lstStyle/>
           <a:p>
-            <a:fld id="{70C018FE-C8D6-4A9C-A702-41F1E0C1C452}" type="datetimeFigureOut">
+            <a:fld id="{5F6C0E4A-51FD-9048-9595-B0D44E99F14B}" type="datetime1">
               <a:rPr lang="en-IN" smtClean="0"/>
-              <a:t>21-05-2019</a:t>
+              <a:t>12/03/21</a:t>
             </a:fld>
             <a:endParaRPr lang="en-IN"/>
           </a:p>
@@ -2476,9 +2470,9 @@
           <a:bodyPr/>
           <a:lstStyle/>
           <a:p>
-            <a:fld id="{70C018FE-C8D6-4A9C-A702-41F1E0C1C452}" type="datetimeFigureOut">
+            <a:fld id="{24994CD1-1EE6-8B40-B0E2-053E00D8616E}" type="datetime1">
               <a:rPr lang="en-IN" smtClean="0"/>
-              <a:t>21-05-2019</a:t>
+              <a:t>12/03/21</a:t>
             </a:fld>
             <a:endParaRPr lang="en-IN"/>
           </a:p>
@@ -2733,9 +2727,9 @@
           <a:bodyPr/>
           <a:lstStyle/>
           <a:p>
-            <a:fld id="{70C018FE-C8D6-4A9C-A702-41F1E0C1C452}" type="datetimeFigureOut">
+            <a:fld id="{58407BEC-E1ED-7B4F-A4AE-3781948C2B01}" type="datetime1">
               <a:rPr lang="en-IN" smtClean="0"/>
-              <a:t>21-05-2019</a:t>
+              <a:t>12/03/21</a:t>
             </a:fld>
             <a:endParaRPr lang="en-IN"/>
           </a:p>
@@ -2944,9 +2938,9 @@
             </a:lvl1pPr>
           </a:lstStyle>
           <a:p>
-            <a:fld id="{70C018FE-C8D6-4A9C-A702-41F1E0C1C452}" type="datetimeFigureOut">
+            <a:fld id="{EFFCC267-BBBB-6D45-A450-D0FCE578B883}" type="datetime1">
               <a:rPr lang="en-IN" smtClean="0"/>
-              <a:t>21-05-2019</a:t>
+              <a:t>12/03/21</a:t>
             </a:fld>
             <a:endParaRPr lang="en-IN" dirty="0"/>
           </a:p>
@@ -2985,10 +2979,7 @@
             </a:lvl1pPr>
           </a:lstStyle>
           <a:p>
-            <a:r>
-              <a:rPr lang="en-IN" dirty="0"/>
-              <a:t>Investment Case Study</a:t>
-            </a:r>
+            <a:endParaRPr lang="en-IN" dirty="0"/>
           </a:p>
         </p:txBody>
       </p:sp>
@@ -3136,6 +3127,7 @@
     <p:sldLayoutId id="2147483670" r:id="rId10"/>
     <p:sldLayoutId id="2147483671" r:id="rId11"/>
   </p:sldLayoutIdLst>
+  <p:hf hdr="0" ftr="0" dt="0"/>
   <p:txStyles>
     <p:titleStyle>
       <a:lvl1pPr algn="l" defTabSz="914400" rtl="0" eaLnBrk="1" latinLnBrk="0" hangingPunct="1">
@@ -3500,8 +3492,37 @@
             <a:pPr algn="l"/>
             <a:r>
               <a:rPr lang="en-IN" sz="1800" dirty="0"/>
-              <a:t>Name:</a:t>
-            </a:r>
+              <a:t>Name: Prabhat Mishra</a:t>
+            </a:r>
+          </a:p>
+        </p:txBody>
+      </p:sp>
+      <p:sp>
+        <p:nvSpPr>
+          <p:cNvPr id="6" name="Slide Number Placeholder 5">
+            <a:extLst>
+              <a:ext uri="{FF2B5EF4-FFF2-40B4-BE49-F238E27FC236}">
+                <a16:creationId xmlns:a16="http://schemas.microsoft.com/office/drawing/2014/main" id="{521F3D07-F65D-7845-A976-AF172BCBAEB3}"/>
+              </a:ext>
+            </a:extLst>
+          </p:cNvPr>
+          <p:cNvSpPr>
+            <a:spLocks noGrp="1"/>
+          </p:cNvSpPr>
+          <p:nvPr>
+            <p:ph type="sldNum" sz="quarter" idx="12"/>
+          </p:nvPr>
+        </p:nvSpPr>
+        <p:spPr/>
+        <p:txBody>
+          <a:bodyPr/>
+          <a:lstStyle/>
+          <a:p>
+            <a:fld id="{B4FB9132-D0D3-4182-9F3A-A2B393A6FF16}" type="slidenum">
+              <a:rPr lang="en-IN" smtClean="0"/>
+              <a:t>1</a:t>
+            </a:fld>
+            <a:endParaRPr lang="en-IN"/>
           </a:p>
         </p:txBody>
       </p:sp>
@@ -3509,91 +3530,6 @@
     <p:extLst>
       <p:ext uri="{BB962C8B-B14F-4D97-AF65-F5344CB8AC3E}">
         <p14:creationId xmlns:p14="http://schemas.microsoft.com/office/powerpoint/2010/main" val="3414739867"/>
-      </p:ext>
-    </p:extLst>
-  </p:cSld>
-  <p:clrMapOvr>
-    <a:masterClrMapping/>
-  </p:clrMapOvr>
-</p:sld>
-</file>
-
-<file path=ppt/slides/slide10.xml><?xml version="1.0" encoding="utf-8"?>
-<p:sld xmlns:a="http://schemas.openxmlformats.org/drawingml/2006/main" xmlns:r="http://schemas.openxmlformats.org/officeDocument/2006/relationships" xmlns:p="http://schemas.openxmlformats.org/presentationml/2006/main">
-  <p:cSld>
-    <p:spTree>
-      <p:nvGrpSpPr>
-        <p:cNvPr id="1" name=""/>
-        <p:cNvGrpSpPr/>
-        <p:nvPr/>
-      </p:nvGrpSpPr>
-      <p:grpSpPr>
-        <a:xfrm>
-          <a:off x="0" y="0"/>
-          <a:ext cx="0" cy="0"/>
-          <a:chOff x="0" y="0"/>
-          <a:chExt cx="0" cy="0"/>
-        </a:xfrm>
-      </p:grpSpPr>
-      <p:sp>
-        <p:nvSpPr>
-          <p:cNvPr id="3" name="Content Placeholder 2"/>
-          <p:cNvSpPr>
-            <a:spLocks noGrp="1"/>
-          </p:cNvSpPr>
-          <p:nvPr>
-            <p:ph idx="1"/>
-          </p:nvPr>
-        </p:nvSpPr>
-        <p:spPr/>
-        <p:txBody>
-          <a:bodyPr>
-            <a:normAutofit/>
-          </a:bodyPr>
-          <a:lstStyle/>
-          <a:p>
-            <a:pPr marL="0" indent="0">
-              <a:buNone/>
-            </a:pPr>
-            <a:endParaRPr lang="en-IN" sz="1400" dirty="0"/>
-          </a:p>
-        </p:txBody>
-      </p:sp>
-      <p:sp>
-        <p:nvSpPr>
-          <p:cNvPr id="5" name="Title 1"/>
-          <p:cNvSpPr>
-            <a:spLocks noGrp="1"/>
-          </p:cNvSpPr>
-          <p:nvPr>
-            <p:ph type="title"/>
-          </p:nvPr>
-        </p:nvSpPr>
-        <p:spPr>
-          <a:xfrm>
-            <a:off x="1136469" y="640080"/>
-            <a:ext cx="9313817" cy="856138"/>
-          </a:xfrm>
-        </p:spPr>
-        <p:txBody>
-          <a:bodyPr/>
-          <a:lstStyle/>
-          <a:p>
-            <a:r>
-              <a:rPr lang="en-IN" b="1" dirty="0"/>
-              <a:t> </a:t>
-            </a:r>
-            <a:r>
-              <a:rPr lang="en-IN" sz="2800" dirty="0"/>
-              <a:t>&lt;Conclusions&gt;</a:t>
-            </a:r>
-          </a:p>
-        </p:txBody>
-      </p:sp>
-    </p:spTree>
-    <p:extLst>
-      <p:ext uri="{BB962C8B-B14F-4D97-AF65-F5344CB8AC3E}">
-        <p14:creationId xmlns:p14="http://schemas.microsoft.com/office/powerpoint/2010/main" val="1399706687"/>
       </p:ext>
     </p:extLst>
   </p:cSld>
@@ -3640,7 +3576,55 @@
             <a:pPr marL="0" indent="0">
               <a:buNone/>
             </a:pPr>
-            <a:endParaRPr lang="en-IN" sz="1400" dirty="0"/>
+            <a:r>
+              <a:rPr lang="en-IN" sz="1800" dirty="0"/>
+              <a:t>An asset management company Spark Funds wants to make investments of  5 to 15 million USD per round of investment in companies across different sectors in different Geographies.</a:t>
+            </a:r>
+          </a:p>
+          <a:p>
+            <a:pPr marL="0" indent="0">
+              <a:buNone/>
+            </a:pPr>
+            <a:r>
+              <a:rPr lang="en-IN" sz="1800" dirty="0"/>
+              <a:t>The objective is to identify:</a:t>
+            </a:r>
+          </a:p>
+          <a:p>
+            <a:pPr marL="342900" indent="-342900">
+              <a:buAutoNum type="arabicPeriod"/>
+            </a:pPr>
+            <a:r>
+              <a:rPr lang="en-IN" sz="1800" dirty="0"/>
+              <a:t>Investment Type</a:t>
+            </a:r>
+          </a:p>
+          <a:p>
+            <a:pPr marL="342900" indent="-342900">
+              <a:buAutoNum type="arabicPeriod"/>
+            </a:pPr>
+            <a:r>
+              <a:rPr lang="en-IN" sz="1800" dirty="0"/>
+              <a:t>Countries ( English Speaking)</a:t>
+            </a:r>
+          </a:p>
+          <a:p>
+            <a:pPr marL="342900" indent="-342900">
+              <a:buAutoNum type="arabicPeriod"/>
+            </a:pPr>
+            <a:r>
+              <a:rPr lang="en-IN" sz="1800" dirty="0"/>
+              <a:t>Sectors</a:t>
+            </a:r>
+          </a:p>
+          <a:p>
+            <a:pPr marL="0" indent="0">
+              <a:buNone/>
+            </a:pPr>
+            <a:r>
+              <a:rPr lang="en-IN" sz="1800" dirty="0"/>
+              <a:t>for making investments based on the investments where other players are majorly investing. </a:t>
+            </a:r>
           </a:p>
         </p:txBody>
       </p:sp>
@@ -3656,22 +3640,85 @@
         </p:nvSpPr>
         <p:spPr>
           <a:xfrm>
-            <a:off x="1136469" y="640080"/>
+            <a:off x="1173045" y="230744"/>
             <a:ext cx="9313817" cy="856138"/>
           </a:xfrm>
         </p:spPr>
         <p:txBody>
+          <a:bodyPr>
+            <a:normAutofit/>
+          </a:bodyPr>
+          <a:lstStyle/>
+          <a:p>
+            <a:r>
+              <a:rPr lang="en-IN" sz="2400" b="1" dirty="0"/>
+              <a:t> Business Objectives</a:t>
+            </a:r>
+          </a:p>
+        </p:txBody>
+      </p:sp>
+      <p:cxnSp>
+        <p:nvCxnSpPr>
+          <p:cNvPr id="4" name="Straight Connector 3">
+            <a:extLst>
+              <a:ext uri="{FF2B5EF4-FFF2-40B4-BE49-F238E27FC236}">
+                <a16:creationId xmlns:a16="http://schemas.microsoft.com/office/drawing/2014/main" id="{783625E1-1BD1-E746-A525-09FFB0569CB9}"/>
+              </a:ext>
+            </a:extLst>
+          </p:cNvPr>
+          <p:cNvCxnSpPr/>
+          <p:nvPr/>
+        </p:nvCxnSpPr>
+        <p:spPr>
+          <a:xfrm>
+            <a:off x="219456" y="1086882"/>
+            <a:ext cx="11520000" cy="0"/>
+          </a:xfrm>
+          <a:prstGeom prst="line">
+            <a:avLst/>
+          </a:prstGeom>
+        </p:spPr>
+        <p:style>
+          <a:lnRef idx="1">
+            <a:schemeClr val="accent1"/>
+          </a:lnRef>
+          <a:fillRef idx="0">
+            <a:schemeClr val="accent1"/>
+          </a:fillRef>
+          <a:effectRef idx="0">
+            <a:schemeClr val="accent1"/>
+          </a:effectRef>
+          <a:fontRef idx="minor">
+            <a:schemeClr val="tx1"/>
+          </a:fontRef>
+        </p:style>
+      </p:cxnSp>
+      <p:sp>
+        <p:nvSpPr>
+          <p:cNvPr id="8" name="Slide Number Placeholder 7">
+            <a:extLst>
+              <a:ext uri="{FF2B5EF4-FFF2-40B4-BE49-F238E27FC236}">
+                <a16:creationId xmlns:a16="http://schemas.microsoft.com/office/drawing/2014/main" id="{E071C09B-A636-6C45-AFED-C5DFD083C78E}"/>
+              </a:ext>
+            </a:extLst>
+          </p:cNvPr>
+          <p:cNvSpPr>
+            <a:spLocks noGrp="1"/>
+          </p:cNvSpPr>
+          <p:nvPr>
+            <p:ph type="sldNum" sz="quarter" idx="12"/>
+          </p:nvPr>
+        </p:nvSpPr>
+        <p:spPr/>
+        <p:txBody>
           <a:bodyPr/>
           <a:lstStyle/>
           <a:p>
             <a:r>
-              <a:rPr lang="en-IN" b="1" dirty="0"/>
-              <a:t> </a:t>
-            </a:r>
-            <a:r>
-              <a:rPr lang="en-IN" sz="2800" dirty="0"/>
-              <a:t>&lt;Abstract&gt;</a:t>
-            </a:r>
+              <a:rPr lang="en-IN"/>
+              <a:t>1</a:t>
+            </a:r>
+            <a:endParaRPr lang="en-IN" dirty="0"/>
           </a:p>
         </p:txBody>
       </p:sp>
@@ -3707,62 +3754,134 @@
       </p:grpSpPr>
       <p:sp>
         <p:nvSpPr>
-          <p:cNvPr id="3" name="Content Placeholder 2"/>
-          <p:cNvSpPr>
-            <a:spLocks noGrp="1"/>
-          </p:cNvSpPr>
-          <p:nvPr>
-            <p:ph idx="1"/>
-          </p:nvPr>
-        </p:nvSpPr>
-        <p:spPr/>
+          <p:cNvPr id="5" name="Title 1"/>
+          <p:cNvSpPr>
+            <a:spLocks noGrp="1"/>
+          </p:cNvSpPr>
+          <p:nvPr>
+            <p:ph type="title"/>
+          </p:nvPr>
+        </p:nvSpPr>
+        <p:spPr>
+          <a:xfrm>
+            <a:off x="1038933" y="223719"/>
+            <a:ext cx="9313817" cy="856138"/>
+          </a:xfrm>
+        </p:spPr>
         <p:txBody>
           <a:bodyPr>
             <a:normAutofit/>
           </a:bodyPr>
           <a:lstStyle/>
           <a:p>
-            <a:pPr marL="0" indent="0">
-              <a:buNone/>
-            </a:pPr>
-            <a:r>
-              <a:rPr lang="en-IN" sz="1800" dirty="0"/>
-              <a:t>Use flow chart</a:t>
-            </a:r>
-          </a:p>
-        </p:txBody>
-      </p:sp>
-      <p:sp>
-        <p:nvSpPr>
-          <p:cNvPr id="5" name="Title 1"/>
-          <p:cNvSpPr>
-            <a:spLocks noGrp="1"/>
-          </p:cNvSpPr>
-          <p:nvPr>
-            <p:ph type="title"/>
-          </p:nvPr>
-        </p:nvSpPr>
-        <p:spPr>
-          <a:xfrm>
-            <a:off x="1136469" y="640080"/>
-            <a:ext cx="9313817" cy="856138"/>
-          </a:xfrm>
-        </p:spPr>
+            <a:r>
+              <a:rPr lang="en-IN" sz="2400" b="1" dirty="0"/>
+              <a:t> Approach</a:t>
+            </a:r>
+          </a:p>
+        </p:txBody>
+      </p:sp>
+      <p:cxnSp>
+        <p:nvCxnSpPr>
+          <p:cNvPr id="4" name="Straight Connector 3">
+            <a:extLst>
+              <a:ext uri="{FF2B5EF4-FFF2-40B4-BE49-F238E27FC236}">
+                <a16:creationId xmlns:a16="http://schemas.microsoft.com/office/drawing/2014/main" id="{342BC33F-2637-B248-9F70-6B4775943B64}"/>
+              </a:ext>
+            </a:extLst>
+          </p:cNvPr>
+          <p:cNvCxnSpPr/>
+          <p:nvPr/>
+        </p:nvCxnSpPr>
+        <p:spPr>
+          <a:xfrm>
+            <a:off x="219456" y="1086882"/>
+            <a:ext cx="11520000" cy="0"/>
+          </a:xfrm>
+          <a:prstGeom prst="line">
+            <a:avLst/>
+          </a:prstGeom>
+        </p:spPr>
+        <p:style>
+          <a:lnRef idx="1">
+            <a:schemeClr val="accent1"/>
+          </a:lnRef>
+          <a:fillRef idx="0">
+            <a:schemeClr val="accent1"/>
+          </a:fillRef>
+          <a:effectRef idx="0">
+            <a:schemeClr val="accent1"/>
+          </a:effectRef>
+          <a:fontRef idx="minor">
+            <a:schemeClr val="tx1"/>
+          </a:fontRef>
+        </p:style>
+      </p:cxnSp>
+      <p:sp>
+        <p:nvSpPr>
+          <p:cNvPr id="8" name="Slide Number Placeholder 7">
+            <a:extLst>
+              <a:ext uri="{FF2B5EF4-FFF2-40B4-BE49-F238E27FC236}">
+                <a16:creationId xmlns:a16="http://schemas.microsoft.com/office/drawing/2014/main" id="{8F383833-3918-7045-BA03-DB588BAEF332}"/>
+              </a:ext>
+            </a:extLst>
+          </p:cNvPr>
+          <p:cNvSpPr>
+            <a:spLocks noGrp="1"/>
+          </p:cNvSpPr>
+          <p:nvPr>
+            <p:ph type="sldNum" sz="quarter" idx="12"/>
+          </p:nvPr>
+        </p:nvSpPr>
+        <p:spPr/>
         <p:txBody>
           <a:bodyPr/>
           <a:lstStyle/>
           <a:p>
             <a:r>
-              <a:rPr lang="en-IN" b="1" dirty="0"/>
-              <a:t> </a:t>
-            </a:r>
-            <a:r>
-              <a:rPr lang="en-IN" sz="2800" dirty="0"/>
-              <a:t>&lt;Problem solving methodology&gt;</a:t>
-            </a:r>
-          </a:p>
-        </p:txBody>
-      </p:sp>
+              <a:rPr lang="en-IN"/>
+              <a:t>1</a:t>
+            </a:r>
+            <a:endParaRPr lang="en-IN" dirty="0"/>
+          </a:p>
+        </p:txBody>
+      </p:sp>
+      <p:pic>
+        <p:nvPicPr>
+          <p:cNvPr id="16" name="Picture 15" descr="Diagram&#10;&#10;Description automatically generated">
+            <a:extLst>
+              <a:ext uri="{FF2B5EF4-FFF2-40B4-BE49-F238E27FC236}">
+                <a16:creationId xmlns:a16="http://schemas.microsoft.com/office/drawing/2014/main" id="{6208FD30-0F1C-9641-A41F-FDB3F0EBD7C7}"/>
+              </a:ext>
+            </a:extLst>
+          </p:cNvPr>
+          <p:cNvPicPr>
+            <a:picLocks noChangeAspect="1"/>
+          </p:cNvPicPr>
+          <p:nvPr/>
+        </p:nvPicPr>
+        <p:blipFill>
+          <a:blip r:embed="rId2">
+            <a:extLst>
+              <a:ext uri="{28A0092B-C50C-407E-A947-70E740481C1C}">
+                <a14:useLocalDpi xmlns:a14="http://schemas.microsoft.com/office/drawing/2010/main" val="0"/>
+              </a:ext>
+            </a:extLst>
+          </a:blip>
+          <a:stretch>
+            <a:fillRect/>
+          </a:stretch>
+        </p:blipFill>
+        <p:spPr>
+          <a:xfrm>
+            <a:off x="336000" y="1271755"/>
+            <a:ext cx="11520000" cy="5362526"/>
+          </a:xfrm>
+          <a:prstGeom prst="rect">
+            <a:avLst/>
+          </a:prstGeom>
+        </p:spPr>
+      </p:pic>
     </p:spTree>
     <p:extLst>
       <p:ext uri="{BB962C8B-B14F-4D97-AF65-F5344CB8AC3E}">
@@ -3803,46 +3922,234 @@
             <p:ph type="title"/>
           </p:nvPr>
         </p:nvSpPr>
-        <p:spPr/>
-        <p:txBody>
-          <a:bodyPr/>
-          <a:lstStyle/>
-          <a:p>
-            <a:r>
-              <a:rPr lang="en-IN" b="1" dirty="0"/>
-              <a:t> </a:t>
-            </a:r>
-            <a:r>
-              <a:rPr lang="en-IN" sz="2800" dirty="0"/>
-              <a:t>&lt;Analysis&gt;</a:t>
-            </a:r>
-          </a:p>
-        </p:txBody>
-      </p:sp>
-      <p:sp>
-        <p:nvSpPr>
-          <p:cNvPr id="3" name="Content Placeholder 2"/>
-          <p:cNvSpPr>
-            <a:spLocks noGrp="1"/>
-          </p:cNvSpPr>
-          <p:nvPr>
-            <p:ph idx="1"/>
-          </p:nvPr>
-        </p:nvSpPr>
-        <p:spPr/>
+        <p:spPr>
+          <a:xfrm>
+            <a:off x="1075509" y="199335"/>
+            <a:ext cx="9313817" cy="856138"/>
+          </a:xfrm>
+        </p:spPr>
         <p:txBody>
           <a:bodyPr>
             <a:normAutofit/>
           </a:bodyPr>
           <a:lstStyle/>
           <a:p>
+            <a:r>
+              <a:rPr lang="en-IN" sz="2400" b="1" dirty="0"/>
+              <a:t>Analysis – Investment Type</a:t>
+            </a:r>
+            <a:endParaRPr lang="en-IN" sz="2400" dirty="0"/>
+          </a:p>
+        </p:txBody>
+      </p:sp>
+      <p:sp>
+        <p:nvSpPr>
+          <p:cNvPr id="3" name="Content Placeholder 2"/>
+          <p:cNvSpPr>
+            <a:spLocks noGrp="1"/>
+          </p:cNvSpPr>
+          <p:nvPr>
+            <p:ph idx="1"/>
+          </p:nvPr>
+        </p:nvSpPr>
+        <p:spPr/>
+        <p:txBody>
+          <a:bodyPr>
+            <a:normAutofit/>
+          </a:bodyPr>
+          <a:lstStyle/>
+          <a:p>
             <a:pPr marL="0" indent="0">
               <a:buNone/>
             </a:pPr>
-            <a:endParaRPr lang="en-IN" sz="1400" dirty="0"/>
-          </a:p>
-        </p:txBody>
-      </p:sp>
+            <a:r>
+              <a:rPr lang="en-IN" sz="1800" dirty="0"/>
+              <a:t>Following steps are performed for identifying Investment Type:</a:t>
+            </a:r>
+          </a:p>
+          <a:p>
+            <a:pPr marL="342900" indent="-342900">
+              <a:buAutoNum type="arabicPeriod"/>
+            </a:pPr>
+            <a:r>
+              <a:rPr lang="en-IN" sz="1800" dirty="0"/>
+              <a:t>Read the companies and rounds2 data.</a:t>
+            </a:r>
+          </a:p>
+          <a:p>
+            <a:pPr marL="342900" indent="-342900">
+              <a:buAutoNum type="arabicPeriod"/>
+            </a:pPr>
+            <a:r>
+              <a:rPr lang="en-IN" sz="1800" dirty="0"/>
+              <a:t>Correct the data quality issues like string manipulation, data type issues etc</a:t>
+            </a:r>
+          </a:p>
+          <a:p>
+            <a:pPr marL="342900" indent="-342900">
+              <a:buAutoNum type="arabicPeriod"/>
+            </a:pPr>
+            <a:r>
+              <a:rPr lang="en-IN" sz="1800" dirty="0"/>
+              <a:t>Merge rounds2 and companies data to associate investments against companies</a:t>
+            </a:r>
+          </a:p>
+          <a:p>
+            <a:pPr marL="342900" indent="-342900">
+              <a:buAutoNum type="arabicPeriod"/>
+            </a:pPr>
+            <a:r>
+              <a:rPr lang="en-IN" sz="1800" dirty="0"/>
+              <a:t>Identify if there are missing values for investment type</a:t>
+            </a:r>
+          </a:p>
+          <a:p>
+            <a:pPr marL="342900" indent="-342900">
+              <a:buAutoNum type="arabicPeriod"/>
+            </a:pPr>
+            <a:r>
+              <a:rPr lang="en-IN" sz="1800" dirty="0"/>
+              <a:t>Filter data for main investment types ( “angel”, “private equity”, “seed” and “venture”)</a:t>
+            </a:r>
+          </a:p>
+          <a:p>
+            <a:pPr marL="342900" indent="-342900">
+              <a:buAutoNum type="arabicPeriod"/>
+            </a:pPr>
+            <a:r>
+              <a:rPr lang="en-IN" sz="1800" dirty="0"/>
+              <a:t>Plot box plot to identify the outliers</a:t>
+            </a:r>
+          </a:p>
+          <a:p>
+            <a:pPr marL="342900" indent="-342900">
+              <a:buAutoNum type="arabicPeriod"/>
+            </a:pPr>
+            <a:r>
+              <a:rPr lang="en-IN" sz="1800" dirty="0"/>
+              <a:t>Calculate the most representative value of the investment amount for each of the four funding type</a:t>
+            </a:r>
+          </a:p>
+          <a:p>
+            <a:pPr marL="342900" indent="-342900">
+              <a:buAutoNum type="arabicPeriod"/>
+            </a:pPr>
+            <a:r>
+              <a:rPr lang="en-IN" sz="1800" dirty="0"/>
+              <a:t>Based on the investment budget per round, best suited investment type is </a:t>
+            </a:r>
+            <a:r>
+              <a:rPr lang="en-IN" sz="1800" b="1" u="sng" dirty="0">
+                <a:solidFill>
+                  <a:srgbClr val="FF0000"/>
+                </a:solidFill>
+              </a:rPr>
+              <a:t>“Venture”</a:t>
+            </a:r>
+          </a:p>
+        </p:txBody>
+      </p:sp>
+      <p:cxnSp>
+        <p:nvCxnSpPr>
+          <p:cNvPr id="4" name="Straight Connector 3">
+            <a:extLst>
+              <a:ext uri="{FF2B5EF4-FFF2-40B4-BE49-F238E27FC236}">
+                <a16:creationId xmlns:a16="http://schemas.microsoft.com/office/drawing/2014/main" id="{F7DAF8BB-0853-7B4A-8DAE-896D97AF28A3}"/>
+              </a:ext>
+            </a:extLst>
+          </p:cNvPr>
+          <p:cNvCxnSpPr/>
+          <p:nvPr/>
+        </p:nvCxnSpPr>
+        <p:spPr>
+          <a:xfrm>
+            <a:off x="219456" y="1086882"/>
+            <a:ext cx="11520000" cy="0"/>
+          </a:xfrm>
+          <a:prstGeom prst="line">
+            <a:avLst/>
+          </a:prstGeom>
+        </p:spPr>
+        <p:style>
+          <a:lnRef idx="1">
+            <a:schemeClr val="accent1"/>
+          </a:lnRef>
+          <a:fillRef idx="0">
+            <a:schemeClr val="accent1"/>
+          </a:fillRef>
+          <a:effectRef idx="0">
+            <a:schemeClr val="accent1"/>
+          </a:effectRef>
+          <a:fontRef idx="minor">
+            <a:schemeClr val="tx1"/>
+          </a:fontRef>
+        </p:style>
+      </p:cxnSp>
+      <p:sp>
+        <p:nvSpPr>
+          <p:cNvPr id="7" name="Slide Number Placeholder 6">
+            <a:extLst>
+              <a:ext uri="{FF2B5EF4-FFF2-40B4-BE49-F238E27FC236}">
+                <a16:creationId xmlns:a16="http://schemas.microsoft.com/office/drawing/2014/main" id="{30916DA8-5BEF-1B4A-B034-257E595AA809}"/>
+              </a:ext>
+            </a:extLst>
+          </p:cNvPr>
+          <p:cNvSpPr>
+            <a:spLocks noGrp="1"/>
+          </p:cNvSpPr>
+          <p:nvPr>
+            <p:ph type="sldNum" sz="quarter" idx="12"/>
+          </p:nvPr>
+        </p:nvSpPr>
+        <p:spPr/>
+        <p:txBody>
+          <a:bodyPr/>
+          <a:lstStyle/>
+          <a:p>
+            <a:r>
+              <a:rPr lang="en-IN"/>
+              <a:t>1</a:t>
+            </a:r>
+            <a:endParaRPr lang="en-IN" dirty="0"/>
+          </a:p>
+        </p:txBody>
+      </p:sp>
+      <p:pic>
+        <p:nvPicPr>
+          <p:cNvPr id="9" name="Picture 8" descr="Table&#10;&#10;Description automatically generated">
+            <a:extLst>
+              <a:ext uri="{FF2B5EF4-FFF2-40B4-BE49-F238E27FC236}">
+                <a16:creationId xmlns:a16="http://schemas.microsoft.com/office/drawing/2014/main" id="{55C4A8E2-BEA7-AA4B-8EB0-4D94FE611267}"/>
+              </a:ext>
+            </a:extLst>
+          </p:cNvPr>
+          <p:cNvPicPr>
+            <a:picLocks noChangeAspect="1"/>
+          </p:cNvPicPr>
+          <p:nvPr/>
+        </p:nvPicPr>
+        <p:blipFill>
+          <a:blip r:embed="rId2">
+            <a:extLst>
+              <a:ext uri="{28A0092B-C50C-407E-A947-70E740481C1C}">
+                <a14:useLocalDpi xmlns:a14="http://schemas.microsoft.com/office/drawing/2010/main" val="0"/>
+              </a:ext>
+            </a:extLst>
+          </a:blip>
+          <a:stretch>
+            <a:fillRect/>
+          </a:stretch>
+        </p:blipFill>
+        <p:spPr>
+          <a:xfrm>
+            <a:off x="8286750" y="1595230"/>
+            <a:ext cx="3390900" cy="2209800"/>
+          </a:xfrm>
+          <a:prstGeom prst="rect">
+            <a:avLst/>
+          </a:prstGeom>
+        </p:spPr>
+      </p:pic>
     </p:spTree>
     <p:extLst>
       <p:ext uri="{BB962C8B-B14F-4D97-AF65-F5344CB8AC3E}">
@@ -3883,46 +4190,222 @@
             <p:ph type="title"/>
           </p:nvPr>
         </p:nvSpPr>
-        <p:spPr/>
-        <p:txBody>
-          <a:bodyPr/>
-          <a:lstStyle/>
-          <a:p>
-            <a:r>
-              <a:rPr lang="en-IN" b="1" dirty="0"/>
-              <a:t> </a:t>
-            </a:r>
-            <a:r>
-              <a:rPr lang="en-IN" sz="2800" dirty="0"/>
-              <a:t>&lt;Analysis&gt;</a:t>
-            </a:r>
-          </a:p>
-        </p:txBody>
-      </p:sp>
-      <p:sp>
-        <p:nvSpPr>
-          <p:cNvPr id="3" name="Content Placeholder 2"/>
-          <p:cNvSpPr>
-            <a:spLocks noGrp="1"/>
-          </p:cNvSpPr>
-          <p:nvPr>
-            <p:ph idx="1"/>
-          </p:nvPr>
-        </p:nvSpPr>
-        <p:spPr/>
+        <p:spPr>
+          <a:xfrm>
+            <a:off x="1099893" y="230744"/>
+            <a:ext cx="9313817" cy="856138"/>
+          </a:xfrm>
+        </p:spPr>
         <p:txBody>
           <a:bodyPr>
             <a:normAutofit/>
           </a:bodyPr>
           <a:lstStyle/>
           <a:p>
+            <a:r>
+              <a:rPr lang="en-IN" sz="2400" b="1" dirty="0"/>
+              <a:t>Analysis – Investment Country</a:t>
+            </a:r>
+            <a:endParaRPr lang="en-IN" sz="2400" dirty="0"/>
+          </a:p>
+        </p:txBody>
+      </p:sp>
+      <p:sp>
+        <p:nvSpPr>
+          <p:cNvPr id="3" name="Content Placeholder 2"/>
+          <p:cNvSpPr>
+            <a:spLocks noGrp="1"/>
+          </p:cNvSpPr>
+          <p:nvPr>
+            <p:ph idx="1"/>
+          </p:nvPr>
+        </p:nvSpPr>
+        <p:spPr>
+          <a:xfrm>
+            <a:off x="404949" y="1854926"/>
+            <a:ext cx="6022355" cy="4344261"/>
+          </a:xfrm>
+        </p:spPr>
+        <p:txBody>
+          <a:bodyPr>
+            <a:normAutofit/>
+          </a:bodyPr>
+          <a:lstStyle/>
+          <a:p>
             <a:pPr marL="0" indent="0">
               <a:buNone/>
             </a:pPr>
-            <a:endParaRPr lang="en-IN" sz="1400" dirty="0"/>
-          </a:p>
-        </p:txBody>
-      </p:sp>
+            <a:r>
+              <a:rPr lang="en-IN" sz="1800" dirty="0"/>
+              <a:t>Following steps are performed for identifying top Countries suited for investment:</a:t>
+            </a:r>
+          </a:p>
+          <a:p>
+            <a:pPr marL="342900" indent="-342900">
+              <a:buAutoNum type="arabicPeriod"/>
+            </a:pPr>
+            <a:r>
+              <a:rPr lang="en-IN" sz="1800" dirty="0"/>
+              <a:t>Filter the master data for shortlisted investment type – venture</a:t>
+            </a:r>
+          </a:p>
+          <a:p>
+            <a:pPr marL="342900" indent="-342900">
+              <a:buAutoNum type="arabicPeriod"/>
+            </a:pPr>
+            <a:r>
+              <a:rPr lang="en-IN" sz="1800" dirty="0"/>
+              <a:t>Calculate the raised amount by each country in all the sectors</a:t>
+            </a:r>
+          </a:p>
+          <a:p>
+            <a:pPr marL="342900" indent="-342900">
+              <a:buAutoNum type="arabicPeriod"/>
+            </a:pPr>
+            <a:r>
+              <a:rPr lang="en-IN" sz="1800" dirty="0"/>
+              <a:t>Plot the bar chart to identify the top countries with the highest amount of funding</a:t>
+            </a:r>
+          </a:p>
+          <a:p>
+            <a:pPr marL="342900" indent="-342900">
+              <a:buAutoNum type="arabicPeriod"/>
+            </a:pPr>
+            <a:r>
+              <a:rPr lang="en-IN" sz="1800" dirty="0"/>
+              <a:t>Shortlist the countries which are English speaking ones.</a:t>
+            </a:r>
+          </a:p>
+          <a:p>
+            <a:pPr marL="342900" indent="-342900">
+              <a:buAutoNum type="arabicPeriod"/>
+            </a:pPr>
+            <a:r>
+              <a:rPr lang="en-IN" sz="1800" dirty="0"/>
+              <a:t>Top English Speaking Countries are</a:t>
+            </a:r>
+            <a:r>
+              <a:rPr lang="en-IN" sz="1800" b="1" u="sng" dirty="0">
+                <a:solidFill>
+                  <a:srgbClr val="FF0000"/>
+                </a:solidFill>
+              </a:rPr>
+              <a:t> “USA, UK and India”</a:t>
+            </a:r>
+            <a:r>
+              <a:rPr lang="en-IN" sz="1800" dirty="0"/>
+              <a:t> with highest total investments.</a:t>
+            </a:r>
+          </a:p>
+          <a:p>
+            <a:pPr marL="342900" indent="-342900">
+              <a:buAutoNum type="arabicPeriod"/>
+            </a:pPr>
+            <a:endParaRPr lang="en-IN" sz="1800" dirty="0"/>
+          </a:p>
+        </p:txBody>
+      </p:sp>
+      <p:cxnSp>
+        <p:nvCxnSpPr>
+          <p:cNvPr id="4" name="Straight Connector 3">
+            <a:extLst>
+              <a:ext uri="{FF2B5EF4-FFF2-40B4-BE49-F238E27FC236}">
+                <a16:creationId xmlns:a16="http://schemas.microsoft.com/office/drawing/2014/main" id="{EE58D1CD-D1EF-224F-96EB-F22BA2217B83}"/>
+              </a:ext>
+            </a:extLst>
+          </p:cNvPr>
+          <p:cNvCxnSpPr/>
+          <p:nvPr/>
+        </p:nvCxnSpPr>
+        <p:spPr>
+          <a:xfrm>
+            <a:off x="219456" y="1086882"/>
+            <a:ext cx="11520000" cy="0"/>
+          </a:xfrm>
+          <a:prstGeom prst="line">
+            <a:avLst/>
+          </a:prstGeom>
+        </p:spPr>
+        <p:style>
+          <a:lnRef idx="1">
+            <a:schemeClr val="accent1"/>
+          </a:lnRef>
+          <a:fillRef idx="0">
+            <a:schemeClr val="accent1"/>
+          </a:fillRef>
+          <a:effectRef idx="0">
+            <a:schemeClr val="accent1"/>
+          </a:effectRef>
+          <a:fontRef idx="minor">
+            <a:schemeClr val="tx1"/>
+          </a:fontRef>
+        </p:style>
+      </p:cxnSp>
+      <p:sp>
+        <p:nvSpPr>
+          <p:cNvPr id="7" name="Slide Number Placeholder 6">
+            <a:extLst>
+              <a:ext uri="{FF2B5EF4-FFF2-40B4-BE49-F238E27FC236}">
+                <a16:creationId xmlns:a16="http://schemas.microsoft.com/office/drawing/2014/main" id="{C818D7DC-D9D2-CC4E-A078-C83B94EC2BDC}"/>
+              </a:ext>
+            </a:extLst>
+          </p:cNvPr>
+          <p:cNvSpPr>
+            <a:spLocks noGrp="1"/>
+          </p:cNvSpPr>
+          <p:nvPr>
+            <p:ph type="sldNum" sz="quarter" idx="12"/>
+          </p:nvPr>
+        </p:nvSpPr>
+        <p:spPr/>
+        <p:txBody>
+          <a:bodyPr/>
+          <a:lstStyle/>
+          <a:p>
+            <a:r>
+              <a:rPr lang="en-IN"/>
+              <a:t>1</a:t>
+            </a:r>
+            <a:endParaRPr lang="en-IN" dirty="0"/>
+          </a:p>
+        </p:txBody>
+      </p:sp>
+      <p:pic>
+        <p:nvPicPr>
+          <p:cNvPr id="11" name="Picture 10" descr="Chart&#10;&#10;Description automatically generated">
+            <a:extLst>
+              <a:ext uri="{FF2B5EF4-FFF2-40B4-BE49-F238E27FC236}">
+                <a16:creationId xmlns:a16="http://schemas.microsoft.com/office/drawing/2014/main" id="{17539E32-D969-7449-8D53-0E7A4ADBD9DD}"/>
+              </a:ext>
+            </a:extLst>
+          </p:cNvPr>
+          <p:cNvPicPr>
+            <a:picLocks noChangeAspect="1"/>
+          </p:cNvPicPr>
+          <p:nvPr/>
+        </p:nvPicPr>
+        <p:blipFill>
+          <a:blip r:embed="rId2">
+            <a:extLst>
+              <a:ext uri="{28A0092B-C50C-407E-A947-70E740481C1C}">
+                <a14:useLocalDpi xmlns:a14="http://schemas.microsoft.com/office/drawing/2010/main" val="0"/>
+              </a:ext>
+            </a:extLst>
+          </a:blip>
+          <a:stretch>
+            <a:fillRect/>
+          </a:stretch>
+        </p:blipFill>
+        <p:spPr>
+          <a:xfrm>
+            <a:off x="6311900" y="1797565"/>
+            <a:ext cx="5880100" cy="4000500"/>
+          </a:xfrm>
+          <a:prstGeom prst="rect">
+            <a:avLst/>
+          </a:prstGeom>
+        </p:spPr>
+      </p:pic>
     </p:spTree>
     <p:extLst>
       <p:ext uri="{BB962C8B-B14F-4D97-AF65-F5344CB8AC3E}">
@@ -3963,46 +4446,273 @@
             <p:ph type="title"/>
           </p:nvPr>
         </p:nvSpPr>
-        <p:spPr/>
-        <p:txBody>
-          <a:bodyPr/>
-          <a:lstStyle/>
-          <a:p>
-            <a:r>
-              <a:rPr lang="en-IN" b="1" dirty="0"/>
-              <a:t> </a:t>
-            </a:r>
-            <a:r>
-              <a:rPr lang="en-IN" sz="2800" dirty="0"/>
-              <a:t>&lt;Analysis&gt;</a:t>
-            </a:r>
-          </a:p>
-        </p:txBody>
-      </p:sp>
-      <p:sp>
-        <p:nvSpPr>
-          <p:cNvPr id="3" name="Content Placeholder 2"/>
-          <p:cNvSpPr>
-            <a:spLocks noGrp="1"/>
-          </p:cNvSpPr>
-          <p:nvPr>
-            <p:ph idx="1"/>
-          </p:nvPr>
-        </p:nvSpPr>
-        <p:spPr/>
+        <p:spPr>
+          <a:xfrm>
+            <a:off x="1099893" y="211527"/>
+            <a:ext cx="9313817" cy="856138"/>
+          </a:xfrm>
+        </p:spPr>
         <p:txBody>
           <a:bodyPr>
             <a:normAutofit/>
           </a:bodyPr>
           <a:lstStyle/>
           <a:p>
+            <a:r>
+              <a:rPr lang="en-IN" sz="2400" b="1" dirty="0"/>
+              <a:t> Analysis – Sector</a:t>
+            </a:r>
+          </a:p>
+        </p:txBody>
+      </p:sp>
+      <p:sp>
+        <p:nvSpPr>
+          <p:cNvPr id="3" name="Content Placeholder 2"/>
+          <p:cNvSpPr>
+            <a:spLocks noGrp="1"/>
+          </p:cNvSpPr>
+          <p:nvPr>
+            <p:ph idx="1"/>
+          </p:nvPr>
+        </p:nvSpPr>
+        <p:spPr>
+          <a:xfrm>
+            <a:off x="391697" y="1256869"/>
+            <a:ext cx="6234390" cy="4344261"/>
+          </a:xfrm>
+        </p:spPr>
+        <p:txBody>
+          <a:bodyPr>
+            <a:normAutofit fontScale="92500" lnSpcReduction="10000"/>
+          </a:bodyPr>
+          <a:lstStyle/>
+          <a:p>
             <a:pPr marL="0" indent="0">
               <a:buNone/>
+            </a:pPr>
+            <a:r>
+              <a:rPr lang="en-IN" sz="1800" dirty="0"/>
+              <a:t>Following steps are performed for identifying top Countries suited for investment:</a:t>
+            </a:r>
+          </a:p>
+          <a:p>
+            <a:pPr marL="342900" indent="-342900">
+              <a:buAutoNum type="arabicPeriod"/>
+            </a:pPr>
+            <a:r>
+              <a:rPr lang="en-IN" sz="1800" dirty="0"/>
+              <a:t>Rad the sector mapping sheet.</a:t>
+            </a:r>
+          </a:p>
+          <a:p>
+            <a:pPr marL="342900" indent="-342900">
+              <a:buAutoNum type="arabicPeriod"/>
+            </a:pPr>
+            <a:r>
+              <a:rPr lang="en-IN" sz="1800" dirty="0"/>
+              <a:t>Correct the data quality issues like string manipulation etc.</a:t>
+            </a:r>
+          </a:p>
+          <a:p>
+            <a:pPr marL="342900" indent="-342900">
+              <a:buFont typeface="Arial" panose="020B0604020202020204" pitchFamily="34" charset="0"/>
+              <a:buAutoNum type="arabicPeriod"/>
+            </a:pPr>
+            <a:r>
+              <a:rPr lang="en-IN" sz="1800" dirty="0"/>
+              <a:t>Filter the master data for shortlisted investment type – venture and  top 3 countries.</a:t>
+            </a:r>
+          </a:p>
+          <a:p>
+            <a:pPr marL="342900" indent="-342900">
+              <a:buAutoNum type="arabicPeriod"/>
+            </a:pPr>
+            <a:r>
+              <a:rPr lang="en-IN" sz="1800" dirty="0"/>
+              <a:t>Unpivot mapping data to get sub sector and main sector information.</a:t>
+            </a:r>
+          </a:p>
+          <a:p>
+            <a:pPr marL="342900" indent="-342900">
+              <a:buAutoNum type="arabicPeriod"/>
+            </a:pPr>
+            <a:r>
+              <a:rPr lang="en-IN" sz="1800" dirty="0"/>
+              <a:t>Apply Business rule decided for identifying the primary sector and main sector for each company.</a:t>
+            </a:r>
+          </a:p>
+          <a:p>
+            <a:pPr marL="342900" indent="-342900">
+              <a:buAutoNum type="arabicPeriod"/>
+            </a:pPr>
+            <a:r>
+              <a:rPr lang="en-IN" sz="1800" dirty="0"/>
+              <a:t>Split the data into 3 countries</a:t>
+            </a:r>
+          </a:p>
+          <a:p>
+            <a:pPr marL="342900" indent="-342900">
+              <a:buAutoNum type="arabicPeriod"/>
+            </a:pPr>
+            <a:r>
+              <a:rPr lang="en-IN" sz="1800" dirty="0"/>
+              <a:t>Calculate the total number of investments and the total amount of investments in each main sector for each of the three countries.</a:t>
+            </a:r>
+          </a:p>
+          <a:p>
+            <a:pPr marL="342900" indent="-342900">
+              <a:buAutoNum type="arabicPeriod"/>
+            </a:pPr>
+            <a:r>
+              <a:rPr lang="en-IN" sz="1800" dirty="0"/>
+              <a:t>Shortlist the main sector for each countries with the highest investments.</a:t>
+            </a:r>
+          </a:p>
+          <a:p>
+            <a:pPr marL="342900" indent="-342900">
+              <a:buAutoNum type="arabicPeriod"/>
             </a:pPr>
             <a:endParaRPr lang="en-IN" sz="1400" dirty="0"/>
           </a:p>
-        </p:txBody>
-      </p:sp>
+          <a:p>
+            <a:pPr marL="342900" indent="-342900">
+              <a:buAutoNum type="arabicPeriod"/>
+            </a:pPr>
+            <a:endParaRPr lang="en-IN" sz="1400" dirty="0"/>
+          </a:p>
+          <a:p>
+            <a:pPr marL="342900" indent="-342900">
+              <a:buAutoNum type="arabicPeriod"/>
+            </a:pPr>
+            <a:endParaRPr lang="en-IN" sz="1400" dirty="0"/>
+          </a:p>
+        </p:txBody>
+      </p:sp>
+      <p:cxnSp>
+        <p:nvCxnSpPr>
+          <p:cNvPr id="4" name="Straight Connector 3">
+            <a:extLst>
+              <a:ext uri="{FF2B5EF4-FFF2-40B4-BE49-F238E27FC236}">
+                <a16:creationId xmlns:a16="http://schemas.microsoft.com/office/drawing/2014/main" id="{90035773-474B-884B-8B3D-AF9468E2B809}"/>
+              </a:ext>
+            </a:extLst>
+          </p:cNvPr>
+          <p:cNvCxnSpPr/>
+          <p:nvPr/>
+        </p:nvCxnSpPr>
+        <p:spPr>
+          <a:xfrm>
+            <a:off x="219456" y="1086882"/>
+            <a:ext cx="11520000" cy="0"/>
+          </a:xfrm>
+          <a:prstGeom prst="line">
+            <a:avLst/>
+          </a:prstGeom>
+        </p:spPr>
+        <p:style>
+          <a:lnRef idx="1">
+            <a:schemeClr val="accent1"/>
+          </a:lnRef>
+          <a:fillRef idx="0">
+            <a:schemeClr val="accent1"/>
+          </a:fillRef>
+          <a:effectRef idx="0">
+            <a:schemeClr val="accent1"/>
+          </a:effectRef>
+          <a:fontRef idx="minor">
+            <a:schemeClr val="tx1"/>
+          </a:fontRef>
+        </p:style>
+      </p:cxnSp>
+      <p:sp>
+        <p:nvSpPr>
+          <p:cNvPr id="7" name="Slide Number Placeholder 6">
+            <a:extLst>
+              <a:ext uri="{FF2B5EF4-FFF2-40B4-BE49-F238E27FC236}">
+                <a16:creationId xmlns:a16="http://schemas.microsoft.com/office/drawing/2014/main" id="{A0116C08-4A4B-0446-997C-B50F27288022}"/>
+              </a:ext>
+            </a:extLst>
+          </p:cNvPr>
+          <p:cNvSpPr>
+            <a:spLocks noGrp="1"/>
+          </p:cNvSpPr>
+          <p:nvPr>
+            <p:ph type="sldNum" sz="quarter" idx="12"/>
+          </p:nvPr>
+        </p:nvSpPr>
+        <p:spPr/>
+        <p:txBody>
+          <a:bodyPr/>
+          <a:lstStyle/>
+          <a:p>
+            <a:r>
+              <a:rPr lang="en-IN"/>
+              <a:t>1</a:t>
+            </a:r>
+            <a:endParaRPr lang="en-IN" dirty="0"/>
+          </a:p>
+        </p:txBody>
+      </p:sp>
+      <p:pic>
+        <p:nvPicPr>
+          <p:cNvPr id="8" name="Picture 7">
+            <a:extLst>
+              <a:ext uri="{FF2B5EF4-FFF2-40B4-BE49-F238E27FC236}">
+                <a16:creationId xmlns:a16="http://schemas.microsoft.com/office/drawing/2014/main" id="{920FEB68-43C5-BD42-A2D2-741D5557D4BA}"/>
+              </a:ext>
+            </a:extLst>
+          </p:cNvPr>
+          <p:cNvPicPr>
+            <a:picLocks noChangeAspect="1"/>
+          </p:cNvPicPr>
+          <p:nvPr/>
+        </p:nvPicPr>
+        <p:blipFill>
+          <a:blip r:embed="rId2"/>
+          <a:stretch>
+            <a:fillRect/>
+          </a:stretch>
+        </p:blipFill>
+        <p:spPr>
+          <a:xfrm>
+            <a:off x="7801038" y="1106100"/>
+            <a:ext cx="3938418" cy="2864304"/>
+          </a:xfrm>
+          <a:prstGeom prst="rect">
+            <a:avLst/>
+          </a:prstGeom>
+        </p:spPr>
+      </p:pic>
+      <p:pic>
+        <p:nvPicPr>
+          <p:cNvPr id="9" name="Picture 8">
+            <a:extLst>
+              <a:ext uri="{FF2B5EF4-FFF2-40B4-BE49-F238E27FC236}">
+                <a16:creationId xmlns:a16="http://schemas.microsoft.com/office/drawing/2014/main" id="{A8437599-578B-7947-A257-6F870FCDFC2F}"/>
+              </a:ext>
+            </a:extLst>
+          </p:cNvPr>
+          <p:cNvPicPr>
+            <a:picLocks noChangeAspect="1"/>
+          </p:cNvPicPr>
+          <p:nvPr/>
+        </p:nvPicPr>
+        <p:blipFill>
+          <a:blip r:embed="rId3"/>
+          <a:stretch>
+            <a:fillRect/>
+          </a:stretch>
+        </p:blipFill>
+        <p:spPr>
+          <a:xfrm>
+            <a:off x="7720585" y="4065130"/>
+            <a:ext cx="4150620" cy="2481446"/>
+          </a:xfrm>
+          <a:prstGeom prst="rect">
+            <a:avLst/>
+          </a:prstGeom>
+        </p:spPr>
+      </p:pic>
     </p:spTree>
     <p:extLst>
       <p:ext uri="{BB962C8B-B14F-4D97-AF65-F5344CB8AC3E}">
@@ -4033,68 +4743,345 @@
           <a:chExt cx="0" cy="0"/>
         </a:xfrm>
       </p:grpSpPr>
-      <p:sp>
-        <p:nvSpPr>
-          <p:cNvPr id="3" name="Content Placeholder 2"/>
-          <p:cNvSpPr>
-            <a:spLocks noGrp="1"/>
-          </p:cNvSpPr>
+      <p:pic>
+        <p:nvPicPr>
+          <p:cNvPr id="2" name="Content Placeholder 1">
+            <a:extLst>
+              <a:ext uri="{FF2B5EF4-FFF2-40B4-BE49-F238E27FC236}">
+                <a16:creationId xmlns:a16="http://schemas.microsoft.com/office/drawing/2014/main" id="{D2508A67-92E2-8A42-8BD7-0AF7154E11F2}"/>
+              </a:ext>
+            </a:extLst>
+          </p:cNvPr>
+          <p:cNvPicPr>
+            <a:picLocks noGrp="1" noChangeAspect="1"/>
+          </p:cNvPicPr>
           <p:nvPr>
             <p:ph idx="1"/>
           </p:nvPr>
-        </p:nvSpPr>
-        <p:spPr/>
+        </p:nvPicPr>
+        <p:blipFill>
+          <a:blip r:embed="rId2"/>
+          <a:stretch>
+            <a:fillRect/>
+          </a:stretch>
+        </p:blipFill>
+        <p:spPr>
+          <a:xfrm>
+            <a:off x="2266565" y="4124449"/>
+            <a:ext cx="9241612" cy="2407706"/>
+          </a:xfrm>
+          <a:prstGeom prst="rect">
+            <a:avLst/>
+          </a:prstGeom>
+        </p:spPr>
+      </p:pic>
+      <p:sp>
+        <p:nvSpPr>
+          <p:cNvPr id="6" name="Title 1"/>
+          <p:cNvSpPr>
+            <a:spLocks noGrp="1"/>
+          </p:cNvSpPr>
+          <p:nvPr>
+            <p:ph type="title"/>
+          </p:nvPr>
+        </p:nvSpPr>
+        <p:spPr>
+          <a:xfrm>
+            <a:off x="3908358" y="6501377"/>
+            <a:ext cx="6994657" cy="309490"/>
+          </a:xfrm>
+        </p:spPr>
         <p:txBody>
           <a:bodyPr>
+            <a:normAutofit fontScale="90000"/>
+          </a:bodyPr>
+          <a:lstStyle/>
+          <a:p>
+            <a:r>
+              <a:rPr lang="en-IN" sz="2000" b="1" dirty="0"/>
+              <a:t> Sectored Wise Investment in selected Countries</a:t>
+            </a:r>
+          </a:p>
+        </p:txBody>
+      </p:sp>
+      <p:pic>
+        <p:nvPicPr>
+          <p:cNvPr id="5" name="Content Placeholder 1">
+            <a:extLst>
+              <a:ext uri="{FF2B5EF4-FFF2-40B4-BE49-F238E27FC236}">
+                <a16:creationId xmlns:a16="http://schemas.microsoft.com/office/drawing/2014/main" id="{D83BFB40-E0E3-E24E-A8BF-C6F94EC4C7EF}"/>
+              </a:ext>
+            </a:extLst>
+          </p:cNvPr>
+          <p:cNvPicPr>
+            <a:picLocks noChangeAspect="1"/>
+          </p:cNvPicPr>
+          <p:nvPr/>
+        </p:nvPicPr>
+        <p:blipFill>
+          <a:blip r:embed="rId3"/>
+          <a:stretch>
+            <a:fillRect/>
+          </a:stretch>
+        </p:blipFill>
+        <p:spPr>
+          <a:xfrm>
+            <a:off x="7213729" y="1097938"/>
+            <a:ext cx="4448491" cy="3026511"/>
+          </a:xfrm>
+          <a:prstGeom prst="rect">
+            <a:avLst/>
+          </a:prstGeom>
+        </p:spPr>
+      </p:pic>
+      <p:pic>
+        <p:nvPicPr>
+          <p:cNvPr id="7" name="Content Placeholder 1">
+            <a:extLst>
+              <a:ext uri="{FF2B5EF4-FFF2-40B4-BE49-F238E27FC236}">
+                <a16:creationId xmlns:a16="http://schemas.microsoft.com/office/drawing/2014/main" id="{1C853EBB-4B24-8F4F-80F5-BE93612B17E8}"/>
+              </a:ext>
+            </a:extLst>
+          </p:cNvPr>
+          <p:cNvPicPr>
+            <a:picLocks noChangeAspect="1"/>
+          </p:cNvPicPr>
+          <p:nvPr/>
+        </p:nvPicPr>
+        <p:blipFill>
+          <a:blip r:embed="rId4"/>
+          <a:stretch>
+            <a:fillRect/>
+          </a:stretch>
+        </p:blipFill>
+        <p:spPr>
+          <a:xfrm>
+            <a:off x="2266565" y="1076626"/>
+            <a:ext cx="4670624" cy="2879558"/>
+          </a:xfrm>
+          <a:prstGeom prst="rect">
+            <a:avLst/>
+          </a:prstGeom>
+        </p:spPr>
+      </p:pic>
+      <p:sp>
+        <p:nvSpPr>
+          <p:cNvPr id="8" name="Title 1">
+            <a:extLst>
+              <a:ext uri="{FF2B5EF4-FFF2-40B4-BE49-F238E27FC236}">
+                <a16:creationId xmlns:a16="http://schemas.microsoft.com/office/drawing/2014/main" id="{D92AA906-3CDC-E944-94B3-796FE7B71A2E}"/>
+              </a:ext>
+            </a:extLst>
+          </p:cNvPr>
+          <p:cNvSpPr txBox="1">
+            <a:spLocks/>
+          </p:cNvSpPr>
+          <p:nvPr/>
+        </p:nvSpPr>
+        <p:spPr>
+          <a:xfrm>
+            <a:off x="8266602" y="3688726"/>
+            <a:ext cx="3049617" cy="467513"/>
+          </a:xfrm>
+          <a:prstGeom prst="rect">
+            <a:avLst/>
+          </a:prstGeom>
+        </p:spPr>
+        <p:txBody>
+          <a:bodyPr vert="horz" lIns="91440" tIns="45720" rIns="91440" bIns="45720" rtlCol="0" anchor="ctr">
             <a:normAutofit/>
           </a:bodyPr>
-          <a:lstStyle/>
-          <a:p>
-            <a:pPr marL="0" indent="0">
-              <a:buNone/>
-            </a:pPr>
-            <a:r>
-              <a:rPr lang="en-IN" sz="1800" dirty="0"/>
-              <a:t>Plot 1</a:t>
-            </a:r>
-          </a:p>
-        </p:txBody>
-      </p:sp>
-      <p:sp>
-        <p:nvSpPr>
-          <p:cNvPr id="6" name="Title 1"/>
-          <p:cNvSpPr>
-            <a:spLocks noGrp="1"/>
-          </p:cNvSpPr>
-          <p:nvPr>
-            <p:ph type="title"/>
-          </p:nvPr>
-        </p:nvSpPr>
-        <p:spPr>
-          <a:xfrm>
-            <a:off x="1136469" y="640080"/>
-            <a:ext cx="9313817" cy="856138"/>
-          </a:xfrm>
-        </p:spPr>
+          <a:lstStyle>
+            <a:lvl1pPr algn="l" defTabSz="914400" rtl="0" eaLnBrk="1" latinLnBrk="0" hangingPunct="1">
+              <a:lnSpc>
+                <a:spcPct val="90000"/>
+              </a:lnSpc>
+              <a:spcBef>
+                <a:spcPct val="0"/>
+              </a:spcBef>
+              <a:buNone/>
+              <a:defRPr sz="4000" kern="1200">
+                <a:solidFill>
+                  <a:schemeClr val="tx1"/>
+                </a:solidFill>
+                <a:latin typeface="Times New Roman" panose="02020603050405020304" pitchFamily="18" charset="0"/>
+                <a:ea typeface="+mj-ea"/>
+                <a:cs typeface="Times New Roman" panose="02020603050405020304" pitchFamily="18" charset="0"/>
+              </a:defRPr>
+            </a:lvl1pPr>
+          </a:lstStyle>
+          <a:p>
+            <a:r>
+              <a:rPr lang="en-IN" sz="1800" b="1" dirty="0"/>
+              <a:t>Country for Investment</a:t>
+            </a:r>
+          </a:p>
+        </p:txBody>
+      </p:sp>
+      <p:sp>
+        <p:nvSpPr>
+          <p:cNvPr id="4" name="Rectangle 3">
+            <a:extLst>
+              <a:ext uri="{FF2B5EF4-FFF2-40B4-BE49-F238E27FC236}">
+                <a16:creationId xmlns:a16="http://schemas.microsoft.com/office/drawing/2014/main" id="{84C24859-08E1-EC4C-A38C-E20D736212A2}"/>
+              </a:ext>
+            </a:extLst>
+          </p:cNvPr>
+          <p:cNvSpPr/>
+          <p:nvPr/>
+        </p:nvSpPr>
+        <p:spPr>
+          <a:xfrm>
+            <a:off x="2880052" y="3756129"/>
+            <a:ext cx="2766655" cy="369332"/>
+          </a:xfrm>
+          <a:prstGeom prst="rect">
+            <a:avLst/>
+          </a:prstGeom>
+        </p:spPr>
+        <p:txBody>
+          <a:bodyPr wrap="none">
+            <a:spAutoFit/>
+          </a:bodyPr>
+          <a:lstStyle/>
+          <a:p>
+            <a:r>
+              <a:rPr lang="en-IN" b="1" dirty="0">
+                <a:latin typeface="Times New Roman" panose="02020603050405020304" pitchFamily="18" charset="0"/>
+                <a:cs typeface="Times New Roman" panose="02020603050405020304" pitchFamily="18" charset="0"/>
+              </a:rPr>
+              <a:t>Investment Type Selection</a:t>
+            </a:r>
+            <a:endParaRPr lang="en-US" dirty="0">
+              <a:latin typeface="Times New Roman" panose="02020603050405020304" pitchFamily="18" charset="0"/>
+              <a:cs typeface="Times New Roman" panose="02020603050405020304" pitchFamily="18" charset="0"/>
+            </a:endParaRPr>
+          </a:p>
+        </p:txBody>
+      </p:sp>
+      <p:sp>
+        <p:nvSpPr>
+          <p:cNvPr id="9" name="Title 1">
+            <a:extLst>
+              <a:ext uri="{FF2B5EF4-FFF2-40B4-BE49-F238E27FC236}">
+                <a16:creationId xmlns:a16="http://schemas.microsoft.com/office/drawing/2014/main" id="{75EB9147-0C04-4947-B530-143D0BE64E13}"/>
+              </a:ext>
+            </a:extLst>
+          </p:cNvPr>
+          <p:cNvSpPr txBox="1">
+            <a:spLocks/>
+          </p:cNvSpPr>
+          <p:nvPr/>
+        </p:nvSpPr>
+        <p:spPr>
+          <a:xfrm>
+            <a:off x="1355663" y="76720"/>
+            <a:ext cx="6470175" cy="1164969"/>
+          </a:xfrm>
+          <a:prstGeom prst="rect">
+            <a:avLst/>
+          </a:prstGeom>
+        </p:spPr>
+        <p:txBody>
+          <a:bodyPr vert="horz" lIns="91440" tIns="45720" rIns="91440" bIns="45720" rtlCol="0" anchor="ctr">
+            <a:normAutofit/>
+          </a:bodyPr>
+          <a:lstStyle>
+            <a:lvl1pPr algn="l" defTabSz="914400" rtl="0" eaLnBrk="1" latinLnBrk="0" hangingPunct="1">
+              <a:lnSpc>
+                <a:spcPct val="90000"/>
+              </a:lnSpc>
+              <a:spcBef>
+                <a:spcPct val="0"/>
+              </a:spcBef>
+              <a:buNone/>
+              <a:defRPr sz="4000" kern="1200">
+                <a:solidFill>
+                  <a:schemeClr val="tx1"/>
+                </a:solidFill>
+                <a:latin typeface="Times New Roman" panose="02020603050405020304" pitchFamily="18" charset="0"/>
+                <a:ea typeface="+mj-ea"/>
+                <a:cs typeface="Times New Roman" panose="02020603050405020304" pitchFamily="18" charset="0"/>
+              </a:defRPr>
+            </a:lvl1pPr>
+          </a:lstStyle>
+          <a:p>
+            <a:r>
+              <a:rPr lang="en-IN" sz="2400" b="1" dirty="0"/>
+              <a:t> Goals Outcome for Investment</a:t>
+            </a:r>
+          </a:p>
+        </p:txBody>
+      </p:sp>
+      <p:cxnSp>
+        <p:nvCxnSpPr>
+          <p:cNvPr id="10" name="Straight Connector 9">
+            <a:extLst>
+              <a:ext uri="{FF2B5EF4-FFF2-40B4-BE49-F238E27FC236}">
+                <a16:creationId xmlns:a16="http://schemas.microsoft.com/office/drawing/2014/main" id="{309FD068-16C3-2841-B819-D1B3DB5D8A7F}"/>
+              </a:ext>
+            </a:extLst>
+          </p:cNvPr>
+          <p:cNvCxnSpPr/>
+          <p:nvPr/>
+        </p:nvCxnSpPr>
+        <p:spPr>
+          <a:xfrm>
+            <a:off x="219456" y="1086882"/>
+            <a:ext cx="11520000" cy="0"/>
+          </a:xfrm>
+          <a:prstGeom prst="line">
+            <a:avLst/>
+          </a:prstGeom>
+        </p:spPr>
+        <p:style>
+          <a:lnRef idx="1">
+            <a:schemeClr val="accent1"/>
+          </a:lnRef>
+          <a:fillRef idx="0">
+            <a:schemeClr val="accent1"/>
+          </a:fillRef>
+          <a:effectRef idx="0">
+            <a:schemeClr val="accent1"/>
+          </a:effectRef>
+          <a:fontRef idx="minor">
+            <a:schemeClr val="tx1"/>
+          </a:fontRef>
+        </p:style>
+      </p:cxnSp>
+      <p:sp>
+        <p:nvSpPr>
+          <p:cNvPr id="13" name="Slide Number Placeholder 12">
+            <a:extLst>
+              <a:ext uri="{FF2B5EF4-FFF2-40B4-BE49-F238E27FC236}">
+                <a16:creationId xmlns:a16="http://schemas.microsoft.com/office/drawing/2014/main" id="{C5750567-2D27-C648-87A6-C0CF0267ABFC}"/>
+              </a:ext>
+            </a:extLst>
+          </p:cNvPr>
+          <p:cNvSpPr>
+            <a:spLocks noGrp="1"/>
+          </p:cNvSpPr>
+          <p:nvPr>
+            <p:ph type="sldNum" sz="quarter" idx="12"/>
+          </p:nvPr>
+        </p:nvSpPr>
+        <p:spPr/>
         <p:txBody>
           <a:bodyPr/>
           <a:lstStyle/>
           <a:p>
             <a:r>
-              <a:rPr lang="en-IN" b="1" dirty="0"/>
-              <a:t> </a:t>
-            </a:r>
-            <a:r>
-              <a:rPr lang="en-IN" sz="2800" dirty="0"/>
-              <a:t>&lt;Results&gt;</a:t>
-            </a:r>
+              <a:rPr lang="en-IN"/>
+              <a:t>1</a:t>
+            </a:r>
+            <a:endParaRPr lang="en-IN" dirty="0"/>
           </a:p>
         </p:txBody>
       </p:sp>
     </p:spTree>
     <p:extLst>
       <p:ext uri="{BB962C8B-B14F-4D97-AF65-F5344CB8AC3E}">
-        <p14:creationId xmlns:p14="http://schemas.microsoft.com/office/powerpoint/2010/main" val="1739856806"/>
+        <p14:creationId xmlns:p14="http://schemas.microsoft.com/office/powerpoint/2010/main" val="1057818561"/>
       </p:ext>
     </p:extLst>
   </p:cSld>
@@ -4142,15 +5129,77 @@
               <a:buNone/>
             </a:pPr>
             <a:r>
-              <a:rPr lang="en-IN" sz="1800" dirty="0"/>
-              <a:t>Plot 2</a:t>
-            </a:r>
-          </a:p>
-        </p:txBody>
-      </p:sp>
-      <p:sp>
-        <p:nvSpPr>
-          <p:cNvPr id="6" name="Title 1"/>
+              <a:rPr lang="en-IN" sz="1600" dirty="0"/>
+              <a:t>Based on the analysis performed on the companies and investment data for each sector. Below are the suggested outcomes for Sparks Funds:</a:t>
+            </a:r>
+          </a:p>
+          <a:p>
+            <a:pPr marL="0" indent="0">
+              <a:buNone/>
+            </a:pPr>
+            <a:endParaRPr lang="en-IN" sz="1600" dirty="0"/>
+          </a:p>
+          <a:p>
+            <a:pPr marL="342900" indent="-342900">
+              <a:buAutoNum type="arabicPeriod"/>
+            </a:pPr>
+            <a:r>
+              <a:rPr lang="en-IN" sz="1600" dirty="0"/>
+              <a:t>Investment in Venture Funds will be best suited.</a:t>
+            </a:r>
+          </a:p>
+          <a:p>
+            <a:pPr marL="342900" indent="-342900">
+              <a:buAutoNum type="arabicPeriod"/>
+            </a:pPr>
+            <a:r>
+              <a:rPr lang="en-IN" sz="1600" dirty="0"/>
+              <a:t>English Speaking Countries: USA, UK and India are highest among Investment received</a:t>
+            </a:r>
+          </a:p>
+          <a:p>
+            <a:pPr marL="342900" indent="-342900">
+              <a:buAutoNum type="arabicPeriod"/>
+            </a:pPr>
+            <a:r>
+              <a:rPr lang="en-IN" sz="1600" dirty="0"/>
+              <a:t>Top Sectors in highly invested companies are:</a:t>
+            </a:r>
+          </a:p>
+          <a:p>
+            <a:pPr lvl="1"/>
+            <a:r>
+              <a:rPr lang="en-IN" sz="1600" dirty="0"/>
+              <a:t>Others</a:t>
+            </a:r>
+          </a:p>
+          <a:p>
+            <a:pPr lvl="1"/>
+            <a:r>
+              <a:rPr lang="en-IN" sz="1600" dirty="0"/>
+              <a:t>Cleantech / Semiconductors</a:t>
+            </a:r>
+          </a:p>
+          <a:p>
+            <a:pPr lvl="1"/>
+            <a:r>
+              <a:rPr lang="en-IN" sz="1600" dirty="0"/>
+              <a:t>Social, Finance, Analytics, Advertising</a:t>
+            </a:r>
+          </a:p>
+          <a:p>
+            <a:pPr lvl="1"/>
+            <a:r>
+              <a:rPr lang="en-IN" sz="1600" dirty="0"/>
+              <a:t>News, Search and Messaging</a:t>
+            </a:r>
+            <a:endParaRPr lang="en-IN" sz="1600" b="1" dirty="0"/>
+          </a:p>
+        </p:txBody>
+      </p:sp>
+      <p:sp>
+        <p:nvSpPr>
+          <p:cNvPr id="5" name="Title 1"/>
           <p:cNvSpPr>
             <a:spLocks noGrp="1"/>
           </p:cNvSpPr>
@@ -4160,117 +5209,93 @@
         </p:nvSpPr>
         <p:spPr>
           <a:xfrm>
-            <a:off x="1136469" y="640080"/>
+            <a:off x="1148661" y="223719"/>
             <a:ext cx="9313817" cy="856138"/>
           </a:xfrm>
         </p:spPr>
         <p:txBody>
+          <a:bodyPr>
+            <a:normAutofit/>
+          </a:bodyPr>
+          <a:lstStyle/>
+          <a:p>
+            <a:r>
+              <a:rPr lang="en-IN" sz="2400" b="1" dirty="0"/>
+              <a:t>Conclusion</a:t>
+            </a:r>
+            <a:endParaRPr lang="en-IN" sz="2400" dirty="0"/>
+          </a:p>
+        </p:txBody>
+      </p:sp>
+      <p:cxnSp>
+        <p:nvCxnSpPr>
+          <p:cNvPr id="10" name="Straight Connector 9">
+            <a:extLst>
+              <a:ext uri="{FF2B5EF4-FFF2-40B4-BE49-F238E27FC236}">
+                <a16:creationId xmlns:a16="http://schemas.microsoft.com/office/drawing/2014/main" id="{9FF12D47-F719-B24F-9C1C-FF37972DE49D}"/>
+              </a:ext>
+            </a:extLst>
+          </p:cNvPr>
+          <p:cNvCxnSpPr/>
+          <p:nvPr/>
+        </p:nvCxnSpPr>
+        <p:spPr>
+          <a:xfrm>
+            <a:off x="219456" y="1086882"/>
+            <a:ext cx="11520000" cy="0"/>
+          </a:xfrm>
+          <a:prstGeom prst="line">
+            <a:avLst/>
+          </a:prstGeom>
+        </p:spPr>
+        <p:style>
+          <a:lnRef idx="1">
+            <a:schemeClr val="accent1"/>
+          </a:lnRef>
+          <a:fillRef idx="0">
+            <a:schemeClr val="accent1"/>
+          </a:fillRef>
+          <a:effectRef idx="0">
+            <a:schemeClr val="accent1"/>
+          </a:effectRef>
+          <a:fontRef idx="minor">
+            <a:schemeClr val="tx1"/>
+          </a:fontRef>
+        </p:style>
+      </p:cxnSp>
+      <p:sp>
+        <p:nvSpPr>
+          <p:cNvPr id="13" name="Slide Number Placeholder 12">
+            <a:extLst>
+              <a:ext uri="{FF2B5EF4-FFF2-40B4-BE49-F238E27FC236}">
+                <a16:creationId xmlns:a16="http://schemas.microsoft.com/office/drawing/2014/main" id="{45A2AECD-B177-1D48-A033-0B00A4CCB435}"/>
+              </a:ext>
+            </a:extLst>
+          </p:cNvPr>
+          <p:cNvSpPr>
+            <a:spLocks noGrp="1"/>
+          </p:cNvSpPr>
+          <p:nvPr>
+            <p:ph type="sldNum" sz="quarter" idx="12"/>
+          </p:nvPr>
+        </p:nvSpPr>
+        <p:spPr/>
+        <p:txBody>
           <a:bodyPr/>
           <a:lstStyle/>
           <a:p>
             <a:r>
-              <a:rPr lang="en-IN" b="1" dirty="0"/>
-              <a:t> </a:t>
-            </a:r>
-            <a:r>
-              <a:rPr lang="en-IN" sz="2800" dirty="0"/>
-              <a:t>&lt;Results&gt;</a:t>
-            </a:r>
+              <a:rPr lang="en-IN"/>
+              <a:t>1</a:t>
+            </a:r>
+            <a:endParaRPr lang="en-IN" dirty="0"/>
           </a:p>
         </p:txBody>
       </p:sp>
     </p:spTree>
     <p:extLst>
       <p:ext uri="{BB962C8B-B14F-4D97-AF65-F5344CB8AC3E}">
-        <p14:creationId xmlns:p14="http://schemas.microsoft.com/office/powerpoint/2010/main" val="3733554285"/>
-      </p:ext>
-    </p:extLst>
-  </p:cSld>
-  <p:clrMapOvr>
-    <a:masterClrMapping/>
-  </p:clrMapOvr>
-</p:sld>
-</file>
-
-<file path=ppt/slides/slide9.xml><?xml version="1.0" encoding="utf-8"?>
-<p:sld xmlns:a="http://schemas.openxmlformats.org/drawingml/2006/main" xmlns:r="http://schemas.openxmlformats.org/officeDocument/2006/relationships" xmlns:p="http://schemas.openxmlformats.org/presentationml/2006/main">
-  <p:cSld>
-    <p:spTree>
-      <p:nvGrpSpPr>
-        <p:cNvPr id="1" name=""/>
-        <p:cNvGrpSpPr/>
-        <p:nvPr/>
-      </p:nvGrpSpPr>
-      <p:grpSpPr>
-        <a:xfrm>
-          <a:off x="0" y="0"/>
-          <a:ext cx="0" cy="0"/>
-          <a:chOff x="0" y="0"/>
-          <a:chExt cx="0" cy="0"/>
-        </a:xfrm>
-      </p:grpSpPr>
-      <p:sp>
-        <p:nvSpPr>
-          <p:cNvPr id="3" name="Content Placeholder 2"/>
-          <p:cNvSpPr>
-            <a:spLocks noGrp="1"/>
-          </p:cNvSpPr>
-          <p:nvPr>
-            <p:ph idx="1"/>
-          </p:nvPr>
-        </p:nvSpPr>
-        <p:spPr/>
-        <p:txBody>
-          <a:bodyPr>
-            <a:normAutofit/>
-          </a:bodyPr>
-          <a:lstStyle/>
-          <a:p>
-            <a:pPr marL="0" indent="0">
-              <a:buNone/>
-            </a:pPr>
-            <a:r>
-              <a:rPr lang="en-IN" sz="1800" dirty="0"/>
-              <a:t>Plot 3</a:t>
-            </a:r>
-          </a:p>
-        </p:txBody>
-      </p:sp>
-      <p:sp>
-        <p:nvSpPr>
-          <p:cNvPr id="6" name="Title 1"/>
-          <p:cNvSpPr>
-            <a:spLocks noGrp="1"/>
-          </p:cNvSpPr>
-          <p:nvPr>
-            <p:ph type="title"/>
-          </p:nvPr>
-        </p:nvSpPr>
-        <p:spPr>
-          <a:xfrm>
-            <a:off x="1136469" y="640080"/>
-            <a:ext cx="9313817" cy="856138"/>
-          </a:xfrm>
-        </p:spPr>
-        <p:txBody>
-          <a:bodyPr/>
-          <a:lstStyle/>
-          <a:p>
-            <a:r>
-              <a:rPr lang="en-IN" b="1" dirty="0"/>
-              <a:t> </a:t>
-            </a:r>
-            <a:r>
-              <a:rPr lang="en-IN" sz="2800" dirty="0"/>
-              <a:t>&lt;Results&gt;</a:t>
-            </a:r>
-          </a:p>
-        </p:txBody>
-      </p:sp>
-    </p:spTree>
-    <p:extLst>
-      <p:ext uri="{BB962C8B-B14F-4D97-AF65-F5344CB8AC3E}">
-        <p14:creationId xmlns:p14="http://schemas.microsoft.com/office/powerpoint/2010/main" val="1057818561"/>
+        <p14:creationId xmlns:p14="http://schemas.microsoft.com/office/powerpoint/2010/main" val="1399706687"/>
       </p:ext>
     </p:extLst>
   </p:cSld>

</xml_diff>